<commit_message>
lots of little edits
</commit_message>
<xml_diff>
--- a/Notebooks/figures/chap02/2/figure.pptx
+++ b/Notebooks/figures/chap02/2/figure.pptx
@@ -289,7 +289,7 @@
           <a:p>
             <a:fld id="{46B215DF-9304-D749-9E36-45FCEA760741}" type="datetimeFigureOut">
               <a:rPr lang="en-US" smtClean="0"/>
-              <a:t>5/7/17</a:t>
+              <a:t>8/30/17</a:t>
             </a:fld>
             <a:endParaRPr lang="en-US"/>
           </a:p>
@@ -459,7 +459,7 @@
           <a:p>
             <a:fld id="{46B215DF-9304-D749-9E36-45FCEA760741}" type="datetimeFigureOut">
               <a:rPr lang="en-US" smtClean="0"/>
-              <a:t>5/7/17</a:t>
+              <a:t>8/30/17</a:t>
             </a:fld>
             <a:endParaRPr lang="en-US"/>
           </a:p>
@@ -639,7 +639,7 @@
           <a:p>
             <a:fld id="{46B215DF-9304-D749-9E36-45FCEA760741}" type="datetimeFigureOut">
               <a:rPr lang="en-US" smtClean="0"/>
-              <a:t>5/7/17</a:t>
+              <a:t>8/30/17</a:t>
             </a:fld>
             <a:endParaRPr lang="en-US"/>
           </a:p>
@@ -5067,7 +5067,7 @@
           <a:p>
             <a:fld id="{46B215DF-9304-D749-9E36-45FCEA760741}" type="datetimeFigureOut">
               <a:rPr lang="en-US" smtClean="0"/>
-              <a:t>5/7/17</a:t>
+              <a:t>8/30/17</a:t>
             </a:fld>
             <a:endParaRPr lang="en-US"/>
           </a:p>
@@ -5991,7 +5991,7 @@
           <a:p>
             <a:fld id="{46B215DF-9304-D749-9E36-45FCEA760741}" type="datetimeFigureOut">
               <a:rPr lang="en-US" smtClean="0"/>
-              <a:t>5/7/17</a:t>
+              <a:t>8/30/17</a:t>
             </a:fld>
             <a:endParaRPr lang="en-US"/>
           </a:p>
@@ -6279,7 +6279,7 @@
           <a:p>
             <a:fld id="{46B215DF-9304-D749-9E36-45FCEA760741}" type="datetimeFigureOut">
               <a:rPr lang="en-US" smtClean="0"/>
-              <a:t>5/7/17</a:t>
+              <a:t>8/30/17</a:t>
             </a:fld>
             <a:endParaRPr lang="en-US"/>
           </a:p>
@@ -6701,7 +6701,7 @@
           <a:p>
             <a:fld id="{46B215DF-9304-D749-9E36-45FCEA760741}" type="datetimeFigureOut">
               <a:rPr lang="en-US" smtClean="0"/>
-              <a:t>5/7/17</a:t>
+              <a:t>8/30/17</a:t>
             </a:fld>
             <a:endParaRPr lang="en-US"/>
           </a:p>
@@ -6819,7 +6819,7 @@
           <a:p>
             <a:fld id="{46B215DF-9304-D749-9E36-45FCEA760741}" type="datetimeFigureOut">
               <a:rPr lang="en-US" smtClean="0"/>
-              <a:t>5/7/17</a:t>
+              <a:t>8/30/17</a:t>
             </a:fld>
             <a:endParaRPr lang="en-US"/>
           </a:p>
@@ -6914,7 +6914,7 @@
           <a:p>
             <a:fld id="{46B215DF-9304-D749-9E36-45FCEA760741}" type="datetimeFigureOut">
               <a:rPr lang="en-US" smtClean="0"/>
-              <a:t>5/7/17</a:t>
+              <a:t>8/30/17</a:t>
             </a:fld>
             <a:endParaRPr lang="en-US"/>
           </a:p>
@@ -7191,7 +7191,7 @@
           <a:p>
             <a:fld id="{46B215DF-9304-D749-9E36-45FCEA760741}" type="datetimeFigureOut">
               <a:rPr lang="en-US" smtClean="0"/>
-              <a:t>5/7/17</a:t>
+              <a:t>8/30/17</a:t>
             </a:fld>
             <a:endParaRPr lang="en-US"/>
           </a:p>
@@ -7448,7 +7448,7 @@
           <a:p>
             <a:fld id="{46B215DF-9304-D749-9E36-45FCEA760741}" type="datetimeFigureOut">
               <a:rPr lang="en-US" smtClean="0"/>
-              <a:t>5/7/17</a:t>
+              <a:t>8/30/17</a:t>
             </a:fld>
             <a:endParaRPr lang="en-US"/>
           </a:p>
@@ -7661,7 +7661,7 @@
           <a:p>
             <a:fld id="{46B215DF-9304-D749-9E36-45FCEA760741}" type="datetimeFigureOut">
               <a:rPr lang="en-US" smtClean="0"/>
-              <a:t>5/7/17</a:t>
+              <a:t>8/30/17</a:t>
             </a:fld>
             <a:endParaRPr lang="en-US"/>
           </a:p>
@@ -11240,7 +11240,7 @@
         <p:spPr>
           <a:xfrm>
             <a:off x="3539039" y="1329631"/>
-            <a:ext cx="1028985" cy="369332"/>
+            <a:ext cx="686068" cy="369332"/>
           </a:xfrm>
           <a:prstGeom prst="rect">
             <a:avLst/>
@@ -11258,7 +11258,7 @@
                 <a:latin typeface="Times"/>
                 <a:cs typeface="Times"/>
               </a:rPr>
-              <a:t>stmt_list</a:t>
+              <a:t>prog</a:t>
             </a:r>
             <a:endParaRPr lang="en-US" i="1" dirty="0">
               <a:latin typeface="Times"/>
@@ -11319,7 +11319,7 @@
         <p:spPr>
           <a:xfrm>
             <a:off x="5817355" y="2084446"/>
-            <a:ext cx="1028985" cy="369332"/>
+            <a:ext cx="686068" cy="369332"/>
           </a:xfrm>
           <a:prstGeom prst="rect">
             <a:avLst/>
@@ -11337,14 +11337,7 @@
                 <a:latin typeface="Times"/>
                 <a:cs typeface="Times"/>
               </a:rPr>
-              <a:t>s</a:t>
-            </a:r>
-            <a:r>
-              <a:rPr lang="en-US" i="1" dirty="0" err="1" smtClean="0">
-                <a:latin typeface="Times"/>
-                <a:cs typeface="Times"/>
-              </a:rPr>
-              <a:t>tmt_list</a:t>
+              <a:t>prog</a:t>
             </a:r>
             <a:endParaRPr lang="en-US" i="1" dirty="0">
               <a:latin typeface="Times"/>
@@ -11523,7 +11516,7 @@
         <p:spPr>
           <a:xfrm flipH="1">
             <a:off x="1943662" y="1698963"/>
-            <a:ext cx="2109870" cy="398442"/>
+            <a:ext cx="1938411" cy="398442"/>
           </a:xfrm>
           <a:prstGeom prst="line">
             <a:avLst/>
@@ -11555,7 +11548,7 @@
         </p:nvCxnSpPr>
         <p:spPr>
           <a:xfrm>
-            <a:off x="4053532" y="1698963"/>
+            <a:off x="3882073" y="1698963"/>
             <a:ext cx="2278316" cy="385483"/>
           </a:xfrm>
           <a:prstGeom prst="line">
@@ -11967,8 +11960,8 @@
         </p:nvSpPr>
         <p:spPr>
           <a:xfrm>
-            <a:off x="7356473" y="2751751"/>
-            <a:ext cx="1028985" cy="369332"/>
+            <a:off x="7302044" y="2751751"/>
+            <a:ext cx="686068" cy="369332"/>
           </a:xfrm>
           <a:prstGeom prst="rect">
             <a:avLst/>
@@ -11986,14 +11979,7 @@
                 <a:latin typeface="Times"/>
                 <a:cs typeface="Times"/>
               </a:rPr>
-              <a:t>s</a:t>
-            </a:r>
-            <a:r>
-              <a:rPr lang="en-US" i="1" dirty="0" err="1" smtClean="0">
-                <a:latin typeface="Times"/>
-                <a:cs typeface="Times"/>
-              </a:rPr>
-              <a:t>tmt_list</a:t>
+              <a:t>prog</a:t>
             </a:r>
             <a:endParaRPr lang="en-US" i="1" dirty="0">
               <a:latin typeface="Times"/>
@@ -12125,7 +12111,7 @@
         <p:spPr>
           <a:xfrm flipH="1">
             <a:off x="5067405" y="2453778"/>
-            <a:ext cx="1264443" cy="236599"/>
+            <a:ext cx="1092984" cy="236599"/>
           </a:xfrm>
           <a:prstGeom prst="line">
             <a:avLst/>
@@ -12157,8 +12143,8 @@
         </p:nvCxnSpPr>
         <p:spPr>
           <a:xfrm>
-            <a:off x="6331848" y="2453778"/>
-            <a:ext cx="1539118" cy="297973"/>
+            <a:off x="6160389" y="2453778"/>
+            <a:ext cx="1484689" cy="297973"/>
           </a:xfrm>
           <a:prstGeom prst="line">
             <a:avLst/>
@@ -12852,14 +12838,7 @@
                 <a:latin typeface="Times"/>
                 <a:cs typeface="Times"/>
               </a:rPr>
-              <a:t>n</a:t>
-            </a:r>
-            <a:r>
-              <a:rPr lang="en-US" i="1" dirty="0" err="1" smtClean="0">
-                <a:latin typeface="Times"/>
-                <a:cs typeface="Times"/>
-              </a:rPr>
-              <a:t>um</a:t>
+              <a:t>num</a:t>
             </a:r>
             <a:endParaRPr lang="en-US" i="1" dirty="0">
               <a:latin typeface="Times"/>
@@ -13011,7 +12990,7 @@
         </p:nvSpPr>
         <p:spPr>
           <a:xfrm>
-            <a:off x="7629826" y="3551890"/>
+            <a:off x="7412110" y="3551890"/>
             <a:ext cx="461710" cy="369332"/>
           </a:xfrm>
           <a:prstGeom prst="rect">
@@ -13026,13 +13005,13 @@
           <a:lstStyle/>
           <a:p>
             <a:r>
-              <a:rPr lang="en-US" smtClean="0">
+              <a:rPr lang="en-US" dirty="0" smtClean="0">
                 <a:latin typeface="Courier New"/>
                 <a:cs typeface="Courier New"/>
               </a:rPr>
               <a:t>“”</a:t>
             </a:r>
-            <a:endParaRPr lang="en-US">
+            <a:endParaRPr lang="en-US" dirty="0">
               <a:latin typeface="Courier New"/>
               <a:cs typeface="Courier New"/>
             </a:endParaRPr>
@@ -13050,84 +13029,8 @@
         </p:nvCxnSpPr>
         <p:spPr>
           <a:xfrm flipH="1">
-            <a:off x="7860681" y="3121083"/>
-            <a:ext cx="10285" cy="430807"/>
-          </a:xfrm>
-          <a:prstGeom prst="line">
-            <a:avLst/>
-          </a:prstGeom>
-        </p:spPr>
-        <p:style>
-          <a:lnRef idx="2">
-            <a:schemeClr val="accent1"/>
-          </a:lnRef>
-          <a:fillRef idx="0">
-            <a:schemeClr val="accent1"/>
-          </a:fillRef>
-          <a:effectRef idx="1">
-            <a:schemeClr val="accent1"/>
-          </a:effectRef>
-          <a:fontRef idx="minor">
-            <a:schemeClr val="tx1"/>
-          </a:fontRef>
-        </p:style>
-      </p:cxnSp>
-      <p:sp>
-        <p:nvSpPr>
-          <p:cNvPr id="54" name="TextBox 53"/>
-          <p:cNvSpPr txBox="1"/>
-          <p:nvPr/>
-        </p:nvSpPr>
-        <p:spPr>
-          <a:xfrm>
-            <a:off x="3708148" y="492306"/>
-            <a:ext cx="686068" cy="369332"/>
-          </a:xfrm>
-          <a:prstGeom prst="rect">
-            <a:avLst/>
-          </a:prstGeom>
-          <a:noFill/>
-        </p:spPr>
-        <p:txBody>
-          <a:bodyPr wrap="none" rtlCol="0">
-            <a:spAutoFit/>
-          </a:bodyPr>
-          <a:lstStyle/>
-          <a:p>
-            <a:r>
-              <a:rPr lang="en-US" i="1" dirty="0" err="1">
-                <a:latin typeface="Times"/>
-                <a:cs typeface="Times"/>
-              </a:rPr>
-              <a:t>p</a:t>
-            </a:r>
-            <a:r>
-              <a:rPr lang="en-US" i="1" dirty="0" err="1" smtClean="0">
-                <a:latin typeface="Times"/>
-                <a:cs typeface="Times"/>
-              </a:rPr>
-              <a:t>rog</a:t>
-            </a:r>
-            <a:endParaRPr lang="en-US" i="1" dirty="0">
-              <a:latin typeface="Times"/>
-              <a:cs typeface="Times"/>
-            </a:endParaRPr>
-          </a:p>
-        </p:txBody>
-      </p:sp>
-      <p:cxnSp>
-        <p:nvCxnSpPr>
-          <p:cNvPr id="11" name="Straight Connector 10"/>
-          <p:cNvCxnSpPr>
-            <a:stCxn id="54" idx="2"/>
-            <a:endCxn id="4" idx="0"/>
-          </p:cNvCxnSpPr>
-          <p:nvPr/>
-        </p:nvCxnSpPr>
-        <p:spPr>
-          <a:xfrm>
-            <a:off x="4051182" y="861638"/>
-            <a:ext cx="2350" cy="467993"/>
+            <a:off x="7642965" y="3121083"/>
+            <a:ext cx="2113" cy="430807"/>
           </a:xfrm>
           <a:prstGeom prst="line">
             <a:avLst/>

</xml_diff>